<commit_message>
Display a Bayes net with component events.
</commit_message>
<xml_diff>
--- a/figures/bnets.pptx
+++ b/figures/bnets.pptx
@@ -1,20 +1,116 @@
 
 <file path=ppt/presentation.xml><?xml version="1.0" encoding="utf-8"?>
-<p:presentation xmlns:a="http://schemas.openxmlformats.org/drawingml/2006/main" xmlns:p="http://schemas.openxmlformats.org/presentationml/2006/main" xmlns:r="http://schemas.openxmlformats.org/officeDocument/2006/relationships">
+<p:presentation xmlns:a="http://schemas.openxmlformats.org/drawingml/2006/main" xmlns:r="http://schemas.openxmlformats.org/officeDocument/2006/relationships" xmlns:p="http://schemas.openxmlformats.org/presentationml/2006/main">
   <p:sldMasterIdLst>
-    <p:sldMasterId id="2147483648" r:id="rId2"/>
+    <p:sldMasterId id="2147483648" r:id="rId1"/>
   </p:sldMasterIdLst>
   <p:sldIdLst>
-    <p:sldId id="256" r:id="rId3"/>
-    <p:sldId id="257" r:id="rId4"/>
+    <p:sldId id="256" r:id="rId2"/>
+    <p:sldId id="257" r:id="rId3"/>
+    <p:sldId id="258" r:id="rId4"/>
   </p:sldIdLst>
-  <p:sldSz cx="9144000" cy="6858000"/>
+  <p:sldSz cx="9144000" cy="6858000" type="screen4x3"/>
   <p:notesSz cx="7772400" cy="10058400"/>
+  <p:defaultTextStyle>
+    <a:defPPr>
+      <a:defRPr lang="en-US"/>
+    </a:defPPr>
+    <a:lvl1pPr marL="0" algn="l" defTabSz="457200" rtl="0" eaLnBrk="1" latinLnBrk="0" hangingPunct="1">
+      <a:defRPr sz="1800" kern="1200">
+        <a:solidFill>
+          <a:schemeClr val="tx1"/>
+        </a:solidFill>
+        <a:latin typeface="+mn-lt"/>
+        <a:ea typeface="+mn-ea"/>
+        <a:cs typeface="+mn-cs"/>
+      </a:defRPr>
+    </a:lvl1pPr>
+    <a:lvl2pPr marL="457200" algn="l" defTabSz="457200" rtl="0" eaLnBrk="1" latinLnBrk="0" hangingPunct="1">
+      <a:defRPr sz="1800" kern="1200">
+        <a:solidFill>
+          <a:schemeClr val="tx1"/>
+        </a:solidFill>
+        <a:latin typeface="+mn-lt"/>
+        <a:ea typeface="+mn-ea"/>
+        <a:cs typeface="+mn-cs"/>
+      </a:defRPr>
+    </a:lvl2pPr>
+    <a:lvl3pPr marL="914400" algn="l" defTabSz="457200" rtl="0" eaLnBrk="1" latinLnBrk="0" hangingPunct="1">
+      <a:defRPr sz="1800" kern="1200">
+        <a:solidFill>
+          <a:schemeClr val="tx1"/>
+        </a:solidFill>
+        <a:latin typeface="+mn-lt"/>
+        <a:ea typeface="+mn-ea"/>
+        <a:cs typeface="+mn-cs"/>
+      </a:defRPr>
+    </a:lvl3pPr>
+    <a:lvl4pPr marL="1371600" algn="l" defTabSz="457200" rtl="0" eaLnBrk="1" latinLnBrk="0" hangingPunct="1">
+      <a:defRPr sz="1800" kern="1200">
+        <a:solidFill>
+          <a:schemeClr val="tx1"/>
+        </a:solidFill>
+        <a:latin typeface="+mn-lt"/>
+        <a:ea typeface="+mn-ea"/>
+        <a:cs typeface="+mn-cs"/>
+      </a:defRPr>
+    </a:lvl4pPr>
+    <a:lvl5pPr marL="1828800" algn="l" defTabSz="457200" rtl="0" eaLnBrk="1" latinLnBrk="0" hangingPunct="1">
+      <a:defRPr sz="1800" kern="1200">
+        <a:solidFill>
+          <a:schemeClr val="tx1"/>
+        </a:solidFill>
+        <a:latin typeface="+mn-lt"/>
+        <a:ea typeface="+mn-ea"/>
+        <a:cs typeface="+mn-cs"/>
+      </a:defRPr>
+    </a:lvl5pPr>
+    <a:lvl6pPr marL="2286000" algn="l" defTabSz="457200" rtl="0" eaLnBrk="1" latinLnBrk="0" hangingPunct="1">
+      <a:defRPr sz="1800" kern="1200">
+        <a:solidFill>
+          <a:schemeClr val="tx1"/>
+        </a:solidFill>
+        <a:latin typeface="+mn-lt"/>
+        <a:ea typeface="+mn-ea"/>
+        <a:cs typeface="+mn-cs"/>
+      </a:defRPr>
+    </a:lvl6pPr>
+    <a:lvl7pPr marL="2743200" algn="l" defTabSz="457200" rtl="0" eaLnBrk="1" latinLnBrk="0" hangingPunct="1">
+      <a:defRPr sz="1800" kern="1200">
+        <a:solidFill>
+          <a:schemeClr val="tx1"/>
+        </a:solidFill>
+        <a:latin typeface="+mn-lt"/>
+        <a:ea typeface="+mn-ea"/>
+        <a:cs typeface="+mn-cs"/>
+      </a:defRPr>
+    </a:lvl7pPr>
+    <a:lvl8pPr marL="3200400" algn="l" defTabSz="457200" rtl="0" eaLnBrk="1" latinLnBrk="0" hangingPunct="1">
+      <a:defRPr sz="1800" kern="1200">
+        <a:solidFill>
+          <a:schemeClr val="tx1"/>
+        </a:solidFill>
+        <a:latin typeface="+mn-lt"/>
+        <a:ea typeface="+mn-ea"/>
+        <a:cs typeface="+mn-cs"/>
+      </a:defRPr>
+    </a:lvl8pPr>
+    <a:lvl9pPr marL="3657600" algn="l" defTabSz="457200" rtl="0" eaLnBrk="1" latinLnBrk="0" hangingPunct="1">
+      <a:defRPr sz="1800" kern="1200">
+        <a:solidFill>
+          <a:schemeClr val="tx1"/>
+        </a:solidFill>
+        <a:latin typeface="+mn-lt"/>
+        <a:ea typeface="+mn-ea"/>
+        <a:cs typeface="+mn-cs"/>
+      </a:defRPr>
+    </a:lvl9pPr>
+  </p:defaultTextStyle>
 </p:presentation>
 </file>
 
 <file path=ppt/slideLayouts/slideLayout1.xml><?xml version="1.0" encoding="utf-8"?>
-<p:sldLayout xmlns:a="http://schemas.openxmlformats.org/drawingml/2006/main" xmlns:p="http://schemas.openxmlformats.org/presentationml/2006/main" xmlns:r="http://schemas.openxmlformats.org/officeDocument/2006/relationships" type="blank" preserve="1">
+<p:sldLayout xmlns:a="http://schemas.openxmlformats.org/drawingml/2006/main" xmlns:r="http://schemas.openxmlformats.org/officeDocument/2006/relationships" xmlns:p="http://schemas.openxmlformats.org/presentationml/2006/main" type="blank" preserve="1">
   <p:cSld name="Blank Slide">
     <p:spTree>
       <p:nvGrpSpPr>
@@ -32,11 +128,14 @@
       </p:grpSpPr>
     </p:spTree>
   </p:cSld>
+  <p:clrMapOvr>
+    <a:masterClrMapping/>
+  </p:clrMapOvr>
 </p:sldLayout>
 </file>
 
 <file path=ppt/slideLayouts/slideLayout10.xml><?xml version="1.0" encoding="utf-8"?>
-<p:sldLayout xmlns:a="http://schemas.openxmlformats.org/drawingml/2006/main" xmlns:p="http://schemas.openxmlformats.org/presentationml/2006/main" xmlns:r="http://schemas.openxmlformats.org/officeDocument/2006/relationships" type="objOverTx" preserve="1">
+<p:sldLayout xmlns:a="http://schemas.openxmlformats.org/drawingml/2006/main" xmlns:r="http://schemas.openxmlformats.org/officeDocument/2006/relationships" xmlns:p="http://schemas.openxmlformats.org/presentationml/2006/main" type="objOverTx" preserve="1">
   <p:cSld name="Title, Content over Content">
     <p:spTree>
       <p:nvGrpSpPr>
@@ -72,7 +171,8 @@
           </a:prstGeom>
         </p:spPr>
         <p:txBody>
-          <a:bodyPr lIns="0" rIns="0" tIns="0" bIns="0" anchor="ctr"/>
+          <a:bodyPr lIns="0" tIns="0" rIns="0" bIns="0" anchor="ctr"/>
+          <a:lstStyle/>
           <a:p>
             <a:pPr algn="ctr"/>
             <a:endParaRPr/>
@@ -99,7 +199,8 @@
           </a:prstGeom>
         </p:spPr>
         <p:txBody>
-          <a:bodyPr lIns="0" rIns="0" tIns="0" bIns="0"/>
+          <a:bodyPr lIns="0" tIns="0" rIns="0" bIns="0"/>
+          <a:lstStyle/>
           <a:p>
             <a:endParaRPr/>
           </a:p>
@@ -125,7 +226,8 @@
           </a:prstGeom>
         </p:spPr>
         <p:txBody>
-          <a:bodyPr lIns="0" rIns="0" tIns="0" bIns="0"/>
+          <a:bodyPr lIns="0" tIns="0" rIns="0" bIns="0"/>
+          <a:lstStyle/>
           <a:p>
             <a:endParaRPr/>
           </a:p>
@@ -133,11 +235,14 @@
       </p:sp>
     </p:spTree>
   </p:cSld>
+  <p:clrMapOvr>
+    <a:masterClrMapping/>
+  </p:clrMapOvr>
 </p:sldLayout>
 </file>
 
 <file path=ppt/slideLayouts/slideLayout11.xml><?xml version="1.0" encoding="utf-8"?>
-<p:sldLayout xmlns:a="http://schemas.openxmlformats.org/drawingml/2006/main" xmlns:p="http://schemas.openxmlformats.org/presentationml/2006/main" xmlns:r="http://schemas.openxmlformats.org/officeDocument/2006/relationships" type="fourObj" preserve="1">
+<p:sldLayout xmlns:a="http://schemas.openxmlformats.org/drawingml/2006/main" xmlns:r="http://schemas.openxmlformats.org/officeDocument/2006/relationships" xmlns:p="http://schemas.openxmlformats.org/presentationml/2006/main" type="fourObj" preserve="1">
   <p:cSld name="Title, 4 Content">
     <p:spTree>
       <p:nvGrpSpPr>
@@ -173,7 +278,8 @@
           </a:prstGeom>
         </p:spPr>
         <p:txBody>
-          <a:bodyPr lIns="0" rIns="0" tIns="0" bIns="0" anchor="ctr"/>
+          <a:bodyPr lIns="0" tIns="0" rIns="0" bIns="0" anchor="ctr"/>
+          <a:lstStyle/>
           <a:p>
             <a:pPr algn="ctr"/>
             <a:endParaRPr/>
@@ -200,7 +306,8 @@
           </a:prstGeom>
         </p:spPr>
         <p:txBody>
-          <a:bodyPr lIns="0" rIns="0" tIns="0" bIns="0"/>
+          <a:bodyPr lIns="0" tIns="0" rIns="0" bIns="0"/>
+          <a:lstStyle/>
           <a:p>
             <a:endParaRPr/>
           </a:p>
@@ -226,7 +333,8 @@
           </a:prstGeom>
         </p:spPr>
         <p:txBody>
-          <a:bodyPr lIns="0" rIns="0" tIns="0" bIns="0"/>
+          <a:bodyPr lIns="0" tIns="0" rIns="0" bIns="0"/>
+          <a:lstStyle/>
           <a:p>
             <a:endParaRPr/>
           </a:p>
@@ -252,7 +360,8 @@
           </a:prstGeom>
         </p:spPr>
         <p:txBody>
-          <a:bodyPr lIns="0" rIns="0" tIns="0" bIns="0"/>
+          <a:bodyPr lIns="0" tIns="0" rIns="0" bIns="0"/>
+          <a:lstStyle/>
           <a:p>
             <a:endParaRPr/>
           </a:p>
@@ -278,7 +387,8 @@
           </a:prstGeom>
         </p:spPr>
         <p:txBody>
-          <a:bodyPr lIns="0" rIns="0" tIns="0" bIns="0"/>
+          <a:bodyPr lIns="0" tIns="0" rIns="0" bIns="0"/>
+          <a:lstStyle/>
           <a:p>
             <a:endParaRPr/>
           </a:p>
@@ -286,11 +396,14 @@
       </p:sp>
     </p:spTree>
   </p:cSld>
+  <p:clrMapOvr>
+    <a:masterClrMapping/>
+  </p:clrMapOvr>
 </p:sldLayout>
 </file>
 
 <file path=ppt/slideLayouts/slideLayout12.xml><?xml version="1.0" encoding="utf-8"?>
-<p:sldLayout xmlns:a="http://schemas.openxmlformats.org/drawingml/2006/main" xmlns:p="http://schemas.openxmlformats.org/presentationml/2006/main" xmlns:r="http://schemas.openxmlformats.org/officeDocument/2006/relationships" type="blank" preserve="1">
+<p:sldLayout xmlns:a="http://schemas.openxmlformats.org/drawingml/2006/main" xmlns:r="http://schemas.openxmlformats.org/officeDocument/2006/relationships" xmlns:p="http://schemas.openxmlformats.org/presentationml/2006/main" type="blank" preserve="1">
   <p:cSld name="Title, 6 Content">
     <p:spTree>
       <p:nvGrpSpPr>
@@ -326,7 +439,8 @@
           </a:prstGeom>
         </p:spPr>
         <p:txBody>
-          <a:bodyPr lIns="0" rIns="0" tIns="0" bIns="0" anchor="ctr"/>
+          <a:bodyPr lIns="0" tIns="0" rIns="0" bIns="0" anchor="ctr"/>
+          <a:lstStyle/>
           <a:p>
             <a:pPr algn="ctr"/>
             <a:endParaRPr/>
@@ -353,7 +467,8 @@
           </a:prstGeom>
         </p:spPr>
         <p:txBody>
-          <a:bodyPr lIns="0" rIns="0" tIns="0" bIns="0"/>
+          <a:bodyPr lIns="0" tIns="0" rIns="0" bIns="0"/>
+          <a:lstStyle/>
           <a:p>
             <a:endParaRPr/>
           </a:p>
@@ -379,7 +494,8 @@
           </a:prstGeom>
         </p:spPr>
         <p:txBody>
-          <a:bodyPr lIns="0" rIns="0" tIns="0" bIns="0"/>
+          <a:bodyPr lIns="0" tIns="0" rIns="0" bIns="0"/>
+          <a:lstStyle/>
           <a:p>
             <a:endParaRPr/>
           </a:p>
@@ -387,7 +503,7 @@
       </p:sp>
       <p:pic>
         <p:nvPicPr>
-          <p:cNvPr id="34" name="" descr=""/>
+          <p:cNvPr id="34" name="Picture 33"/>
           <p:cNvPicPr/>
           <p:nvPr/>
         </p:nvPicPr>
@@ -412,12 +528,12 @@
       </p:pic>
       <p:pic>
         <p:nvPicPr>
-          <p:cNvPr id="35" name="" descr=""/>
+          <p:cNvPr id="35" name="Picture 34"/>
           <p:cNvPicPr/>
           <p:nvPr/>
         </p:nvPicPr>
         <p:blipFill>
-          <a:blip r:embed="rId3"/>
+          <a:blip r:embed="rId2"/>
           <a:stretch>
             <a:fillRect/>
           </a:stretch>
@@ -437,11 +553,14 @@
       </p:pic>
     </p:spTree>
   </p:cSld>
+  <p:clrMapOvr>
+    <a:masterClrMapping/>
+  </p:clrMapOvr>
 </p:sldLayout>
 </file>
 
 <file path=ppt/slideLayouts/slideLayout2.xml><?xml version="1.0" encoding="utf-8"?>
-<p:sldLayout xmlns:a="http://schemas.openxmlformats.org/drawingml/2006/main" xmlns:p="http://schemas.openxmlformats.org/presentationml/2006/main" xmlns:r="http://schemas.openxmlformats.org/officeDocument/2006/relationships" type="tx" preserve="1">
+<p:sldLayout xmlns:a="http://schemas.openxmlformats.org/drawingml/2006/main" xmlns:r="http://schemas.openxmlformats.org/officeDocument/2006/relationships" xmlns:p="http://schemas.openxmlformats.org/presentationml/2006/main" type="tx" preserve="1">
   <p:cSld name="Title Slide">
     <p:spTree>
       <p:nvGrpSpPr>
@@ -477,7 +596,8 @@
           </a:prstGeom>
         </p:spPr>
         <p:txBody>
-          <a:bodyPr lIns="0" rIns="0" tIns="0" bIns="0" anchor="ctr"/>
+          <a:bodyPr lIns="0" tIns="0" rIns="0" bIns="0" anchor="ctr"/>
+          <a:lstStyle/>
           <a:p>
             <a:pPr algn="ctr"/>
             <a:endParaRPr/>
@@ -504,7 +624,8 @@
           </a:prstGeom>
         </p:spPr>
         <p:txBody>
-          <a:bodyPr lIns="0" rIns="0" tIns="0" bIns="0" anchor="ctr"/>
+          <a:bodyPr lIns="0" tIns="0" rIns="0" bIns="0" anchor="ctr"/>
+          <a:lstStyle/>
           <a:p>
             <a:pPr algn="ctr"/>
             <a:endParaRPr/>
@@ -513,11 +634,14 @@
       </p:sp>
     </p:spTree>
   </p:cSld>
+  <p:clrMapOvr>
+    <a:masterClrMapping/>
+  </p:clrMapOvr>
 </p:sldLayout>
 </file>
 
 <file path=ppt/slideLayouts/slideLayout3.xml><?xml version="1.0" encoding="utf-8"?>
-<p:sldLayout xmlns:a="http://schemas.openxmlformats.org/drawingml/2006/main" xmlns:p="http://schemas.openxmlformats.org/presentationml/2006/main" xmlns:r="http://schemas.openxmlformats.org/officeDocument/2006/relationships" type="obj" preserve="1">
+<p:sldLayout xmlns:a="http://schemas.openxmlformats.org/drawingml/2006/main" xmlns:r="http://schemas.openxmlformats.org/officeDocument/2006/relationships" xmlns:p="http://schemas.openxmlformats.org/presentationml/2006/main" type="obj" preserve="1">
   <p:cSld name="Title, Content">
     <p:spTree>
       <p:nvGrpSpPr>
@@ -553,7 +677,8 @@
           </a:prstGeom>
         </p:spPr>
         <p:txBody>
-          <a:bodyPr lIns="0" rIns="0" tIns="0" bIns="0" anchor="ctr"/>
+          <a:bodyPr lIns="0" tIns="0" rIns="0" bIns="0" anchor="ctr"/>
+          <a:lstStyle/>
           <a:p>
             <a:pPr algn="ctr"/>
             <a:endParaRPr/>
@@ -580,7 +705,8 @@
           </a:prstGeom>
         </p:spPr>
         <p:txBody>
-          <a:bodyPr lIns="0" rIns="0" tIns="0" bIns="0"/>
+          <a:bodyPr lIns="0" tIns="0" rIns="0" bIns="0"/>
+          <a:lstStyle/>
           <a:p>
             <a:endParaRPr/>
           </a:p>
@@ -588,11 +714,14 @@
       </p:sp>
     </p:spTree>
   </p:cSld>
+  <p:clrMapOvr>
+    <a:masterClrMapping/>
+  </p:clrMapOvr>
 </p:sldLayout>
 </file>
 
 <file path=ppt/slideLayouts/slideLayout4.xml><?xml version="1.0" encoding="utf-8"?>
-<p:sldLayout xmlns:a="http://schemas.openxmlformats.org/drawingml/2006/main" xmlns:p="http://schemas.openxmlformats.org/presentationml/2006/main" xmlns:r="http://schemas.openxmlformats.org/officeDocument/2006/relationships" type="twoObj" preserve="1">
+<p:sldLayout xmlns:a="http://schemas.openxmlformats.org/drawingml/2006/main" xmlns:r="http://schemas.openxmlformats.org/officeDocument/2006/relationships" xmlns:p="http://schemas.openxmlformats.org/presentationml/2006/main" type="twoObj" preserve="1">
   <p:cSld name="Title, 2 Content">
     <p:spTree>
       <p:nvGrpSpPr>
@@ -628,7 +757,8 @@
           </a:prstGeom>
         </p:spPr>
         <p:txBody>
-          <a:bodyPr lIns="0" rIns="0" tIns="0" bIns="0" anchor="ctr"/>
+          <a:bodyPr lIns="0" tIns="0" rIns="0" bIns="0" anchor="ctr"/>
+          <a:lstStyle/>
           <a:p>
             <a:pPr algn="ctr"/>
             <a:endParaRPr/>
@@ -655,7 +785,8 @@
           </a:prstGeom>
         </p:spPr>
         <p:txBody>
-          <a:bodyPr lIns="0" rIns="0" tIns="0" bIns="0"/>
+          <a:bodyPr lIns="0" tIns="0" rIns="0" bIns="0"/>
+          <a:lstStyle/>
           <a:p>
             <a:endParaRPr/>
           </a:p>
@@ -681,7 +812,8 @@
           </a:prstGeom>
         </p:spPr>
         <p:txBody>
-          <a:bodyPr lIns="0" rIns="0" tIns="0" bIns="0"/>
+          <a:bodyPr lIns="0" tIns="0" rIns="0" bIns="0"/>
+          <a:lstStyle/>
           <a:p>
             <a:endParaRPr/>
           </a:p>
@@ -689,11 +821,14 @@
       </p:sp>
     </p:spTree>
   </p:cSld>
+  <p:clrMapOvr>
+    <a:masterClrMapping/>
+  </p:clrMapOvr>
 </p:sldLayout>
 </file>
 
 <file path=ppt/slideLayouts/slideLayout5.xml><?xml version="1.0" encoding="utf-8"?>
-<p:sldLayout xmlns:a="http://schemas.openxmlformats.org/drawingml/2006/main" xmlns:p="http://schemas.openxmlformats.org/presentationml/2006/main" xmlns:r="http://schemas.openxmlformats.org/officeDocument/2006/relationships" type="titleOnly" preserve="1">
+<p:sldLayout xmlns:a="http://schemas.openxmlformats.org/drawingml/2006/main" xmlns:r="http://schemas.openxmlformats.org/officeDocument/2006/relationships" xmlns:p="http://schemas.openxmlformats.org/presentationml/2006/main" type="titleOnly" preserve="1">
   <p:cSld name="Title Only">
     <p:spTree>
       <p:nvGrpSpPr>
@@ -729,7 +864,8 @@
           </a:prstGeom>
         </p:spPr>
         <p:txBody>
-          <a:bodyPr lIns="0" rIns="0" tIns="0" bIns="0" anchor="ctr"/>
+          <a:bodyPr lIns="0" tIns="0" rIns="0" bIns="0" anchor="ctr"/>
+          <a:lstStyle/>
           <a:p>
             <a:pPr algn="ctr"/>
             <a:endParaRPr/>
@@ -738,11 +874,14 @@
       </p:sp>
     </p:spTree>
   </p:cSld>
+  <p:clrMapOvr>
+    <a:masterClrMapping/>
+  </p:clrMapOvr>
 </p:sldLayout>
 </file>
 
 <file path=ppt/slideLayouts/slideLayout6.xml><?xml version="1.0" encoding="utf-8"?>
-<p:sldLayout xmlns:a="http://schemas.openxmlformats.org/drawingml/2006/main" xmlns:p="http://schemas.openxmlformats.org/presentationml/2006/main" xmlns:r="http://schemas.openxmlformats.org/officeDocument/2006/relationships" type="objOnly" preserve="1">
+<p:sldLayout xmlns:a="http://schemas.openxmlformats.org/drawingml/2006/main" xmlns:r="http://schemas.openxmlformats.org/officeDocument/2006/relationships" xmlns:p="http://schemas.openxmlformats.org/presentationml/2006/main" type="objOnly" preserve="1">
   <p:cSld name="Centered Text">
     <p:spTree>
       <p:nvGrpSpPr>
@@ -778,7 +917,8 @@
           </a:prstGeom>
         </p:spPr>
         <p:txBody>
-          <a:bodyPr lIns="0" rIns="0" tIns="0" bIns="0" anchor="ctr"/>
+          <a:bodyPr lIns="0" tIns="0" rIns="0" bIns="0" anchor="ctr"/>
+          <a:lstStyle/>
           <a:p>
             <a:pPr algn="ctr"/>
             <a:endParaRPr/>
@@ -787,11 +927,14 @@
       </p:sp>
     </p:spTree>
   </p:cSld>
+  <p:clrMapOvr>
+    <a:masterClrMapping/>
+  </p:clrMapOvr>
 </p:sldLayout>
 </file>
 
 <file path=ppt/slideLayouts/slideLayout7.xml><?xml version="1.0" encoding="utf-8"?>
-<p:sldLayout xmlns:a="http://schemas.openxmlformats.org/drawingml/2006/main" xmlns:p="http://schemas.openxmlformats.org/presentationml/2006/main" xmlns:r="http://schemas.openxmlformats.org/officeDocument/2006/relationships" type="twoObjAndObj" preserve="1">
+<p:sldLayout xmlns:a="http://schemas.openxmlformats.org/drawingml/2006/main" xmlns:r="http://schemas.openxmlformats.org/officeDocument/2006/relationships" xmlns:p="http://schemas.openxmlformats.org/presentationml/2006/main" type="twoObjAndObj" preserve="1">
   <p:cSld name="Title, 2 Content and Content">
     <p:spTree>
       <p:nvGrpSpPr>
@@ -827,7 +970,8 @@
           </a:prstGeom>
         </p:spPr>
         <p:txBody>
-          <a:bodyPr lIns="0" rIns="0" tIns="0" bIns="0" anchor="ctr"/>
+          <a:bodyPr lIns="0" tIns="0" rIns="0" bIns="0" anchor="ctr"/>
+          <a:lstStyle/>
           <a:p>
             <a:pPr algn="ctr"/>
             <a:endParaRPr/>
@@ -854,7 +998,8 @@
           </a:prstGeom>
         </p:spPr>
         <p:txBody>
-          <a:bodyPr lIns="0" rIns="0" tIns="0" bIns="0"/>
+          <a:bodyPr lIns="0" tIns="0" rIns="0" bIns="0"/>
+          <a:lstStyle/>
           <a:p>
             <a:endParaRPr/>
           </a:p>
@@ -880,7 +1025,8 @@
           </a:prstGeom>
         </p:spPr>
         <p:txBody>
-          <a:bodyPr lIns="0" rIns="0" tIns="0" bIns="0"/>
+          <a:bodyPr lIns="0" tIns="0" rIns="0" bIns="0"/>
+          <a:lstStyle/>
           <a:p>
             <a:endParaRPr/>
           </a:p>
@@ -906,7 +1052,8 @@
           </a:prstGeom>
         </p:spPr>
         <p:txBody>
-          <a:bodyPr lIns="0" rIns="0" tIns="0" bIns="0"/>
+          <a:bodyPr lIns="0" tIns="0" rIns="0" bIns="0"/>
+          <a:lstStyle/>
           <a:p>
             <a:endParaRPr/>
           </a:p>
@@ -914,11 +1061,14 @@
       </p:sp>
     </p:spTree>
   </p:cSld>
+  <p:clrMapOvr>
+    <a:masterClrMapping/>
+  </p:clrMapOvr>
 </p:sldLayout>
 </file>
 
 <file path=ppt/slideLayouts/slideLayout8.xml><?xml version="1.0" encoding="utf-8"?>
-<p:sldLayout xmlns:a="http://schemas.openxmlformats.org/drawingml/2006/main" xmlns:p="http://schemas.openxmlformats.org/presentationml/2006/main" xmlns:r="http://schemas.openxmlformats.org/officeDocument/2006/relationships" type="objAndTwoObj" preserve="1">
+<p:sldLayout xmlns:a="http://schemas.openxmlformats.org/drawingml/2006/main" xmlns:r="http://schemas.openxmlformats.org/officeDocument/2006/relationships" xmlns:p="http://schemas.openxmlformats.org/presentationml/2006/main" type="objAndTwoObj" preserve="1">
   <p:cSld name="Title Content and 2 Content">
     <p:spTree>
       <p:nvGrpSpPr>
@@ -954,7 +1104,8 @@
           </a:prstGeom>
         </p:spPr>
         <p:txBody>
-          <a:bodyPr lIns="0" rIns="0" tIns="0" bIns="0" anchor="ctr"/>
+          <a:bodyPr lIns="0" tIns="0" rIns="0" bIns="0" anchor="ctr"/>
+          <a:lstStyle/>
           <a:p>
             <a:pPr algn="ctr"/>
             <a:endParaRPr/>
@@ -981,7 +1132,8 @@
           </a:prstGeom>
         </p:spPr>
         <p:txBody>
-          <a:bodyPr lIns="0" rIns="0" tIns="0" bIns="0"/>
+          <a:bodyPr lIns="0" tIns="0" rIns="0" bIns="0"/>
+          <a:lstStyle/>
           <a:p>
             <a:endParaRPr/>
           </a:p>
@@ -1007,7 +1159,8 @@
           </a:prstGeom>
         </p:spPr>
         <p:txBody>
-          <a:bodyPr lIns="0" rIns="0" tIns="0" bIns="0"/>
+          <a:bodyPr lIns="0" tIns="0" rIns="0" bIns="0"/>
+          <a:lstStyle/>
           <a:p>
             <a:endParaRPr/>
           </a:p>
@@ -1033,7 +1186,8 @@
           </a:prstGeom>
         </p:spPr>
         <p:txBody>
-          <a:bodyPr lIns="0" rIns="0" tIns="0" bIns="0"/>
+          <a:bodyPr lIns="0" tIns="0" rIns="0" bIns="0"/>
+          <a:lstStyle/>
           <a:p>
             <a:endParaRPr/>
           </a:p>
@@ -1041,11 +1195,14 @@
       </p:sp>
     </p:spTree>
   </p:cSld>
+  <p:clrMapOvr>
+    <a:masterClrMapping/>
+  </p:clrMapOvr>
 </p:sldLayout>
 </file>
 
 <file path=ppt/slideLayouts/slideLayout9.xml><?xml version="1.0" encoding="utf-8"?>
-<p:sldLayout xmlns:a="http://schemas.openxmlformats.org/drawingml/2006/main" xmlns:p="http://schemas.openxmlformats.org/presentationml/2006/main" xmlns:r="http://schemas.openxmlformats.org/officeDocument/2006/relationships" type="twoObjOverTx" preserve="1">
+<p:sldLayout xmlns:a="http://schemas.openxmlformats.org/drawingml/2006/main" xmlns:r="http://schemas.openxmlformats.org/officeDocument/2006/relationships" xmlns:p="http://schemas.openxmlformats.org/presentationml/2006/main" type="twoObjOverTx" preserve="1">
   <p:cSld name="Title, 2 Content over Content">
     <p:spTree>
       <p:nvGrpSpPr>
@@ -1081,7 +1238,8 @@
           </a:prstGeom>
         </p:spPr>
         <p:txBody>
-          <a:bodyPr lIns="0" rIns="0" tIns="0" bIns="0" anchor="ctr"/>
+          <a:bodyPr lIns="0" tIns="0" rIns="0" bIns="0" anchor="ctr"/>
+          <a:lstStyle/>
           <a:p>
             <a:pPr algn="ctr"/>
             <a:endParaRPr/>
@@ -1108,7 +1266,8 @@
           </a:prstGeom>
         </p:spPr>
         <p:txBody>
-          <a:bodyPr lIns="0" rIns="0" tIns="0" bIns="0"/>
+          <a:bodyPr lIns="0" tIns="0" rIns="0" bIns="0"/>
+          <a:lstStyle/>
           <a:p>
             <a:endParaRPr/>
           </a:p>
@@ -1134,7 +1293,8 @@
           </a:prstGeom>
         </p:spPr>
         <p:txBody>
-          <a:bodyPr lIns="0" rIns="0" tIns="0" bIns="0"/>
+          <a:bodyPr lIns="0" tIns="0" rIns="0" bIns="0"/>
+          <a:lstStyle/>
           <a:p>
             <a:endParaRPr/>
           </a:p>
@@ -1160,7 +1320,8 @@
           </a:prstGeom>
         </p:spPr>
         <p:txBody>
-          <a:bodyPr lIns="0" rIns="0" tIns="0" bIns="0"/>
+          <a:bodyPr lIns="0" tIns="0" rIns="0" bIns="0"/>
+          <a:lstStyle/>
           <a:p>
             <a:endParaRPr/>
           </a:p>
@@ -1168,17 +1329,21 @@
       </p:sp>
     </p:spTree>
   </p:cSld>
+  <p:clrMapOvr>
+    <a:masterClrMapping/>
+  </p:clrMapOvr>
 </p:sldLayout>
 </file>
 
 <file path=ppt/slideMasters/slideMaster1.xml><?xml version="1.0" encoding="utf-8"?>
-<p:sldMaster xmlns:a="http://schemas.openxmlformats.org/drawingml/2006/main" xmlns:p="http://schemas.openxmlformats.org/presentationml/2006/main" xmlns:r="http://schemas.openxmlformats.org/officeDocument/2006/relationships">
+<p:sldMaster xmlns:a="http://schemas.openxmlformats.org/drawingml/2006/main" xmlns:r="http://schemas.openxmlformats.org/officeDocument/2006/relationships" xmlns:p="http://schemas.openxmlformats.org/presentationml/2006/main">
   <p:cSld>
     <p:bg>
       <p:bgPr>
         <a:solidFill>
-          <a:srgbClr val="ffffff"/>
+          <a:srgbClr val="FFFFFF"/>
         </a:solidFill>
+        <a:effectLst/>
       </p:bgPr>
     </p:bg>
     <p:spTree>
@@ -1197,7 +1362,7 @@
       </p:grpSpPr>
       <p:sp>
         <p:nvSpPr>
-          <p:cNvPr id="0" name="PlaceHolder 1"/>
+          <p:cNvPr id="2" name="PlaceHolder 1"/>
           <p:cNvSpPr>
             <a:spLocks noGrp="1"/>
           </p:cNvSpPr>
@@ -1215,7 +1380,8 @@
           </a:prstGeom>
         </p:spPr>
         <p:txBody>
-          <a:bodyPr lIns="0" rIns="0" tIns="0" bIns="0" anchor="ctr"/>
+          <a:bodyPr lIns="0" tIns="0" rIns="0" bIns="0" anchor="ctr"/>
+          <a:lstStyle/>
           <a:p>
             <a:pPr algn="ctr"/>
             <a:r>
@@ -1230,7 +1396,7 @@
       </p:sp>
       <p:sp>
         <p:nvSpPr>
-          <p:cNvPr id="1" name="PlaceHolder 2"/>
+          <p:cNvPr id="3" name="PlaceHolder 2"/>
           <p:cNvSpPr>
             <a:spLocks noGrp="1"/>
           </p:cNvSpPr>
@@ -1248,7 +1414,8 @@
           </a:prstGeom>
         </p:spPr>
         <p:txBody>
-          <a:bodyPr lIns="0" rIns="0" tIns="0" bIns="0"/>
+          <a:bodyPr lIns="0" tIns="0" rIns="0" bIns="0"/>
+          <a:lstStyle/>
           <a:p>
             <a:pPr>
               <a:buSzPct val="45000"/>
@@ -1351,26 +1518,31 @@
       </p:sp>
     </p:spTree>
   </p:cSld>
-  <p:clrMap bg1="lt1" bg2="lt2" tx1="dk1" tx2="dk2" accent1="accent1" accent2="accent2" accent3="accent3" accent4="accent4" accent5="accent5" accent6="accent6" hlink="hlink" folHlink="folHlink"/>
+  <p:clrMap bg1="lt1" tx1="dk1" bg2="lt2" tx2="dk2" accent1="accent1" accent2="accent2" accent3="accent3" accent4="accent4" accent5="accent5" accent6="accent6" hlink="hlink" folHlink="folHlink"/>
   <p:sldLayoutIdLst>
-    <p:sldLayoutId id="2147483649" r:id="rId2"/>
-    <p:sldLayoutId id="2147483650" r:id="rId3"/>
-    <p:sldLayoutId id="2147483651" r:id="rId4"/>
-    <p:sldLayoutId id="2147483652" r:id="rId5"/>
-    <p:sldLayoutId id="2147483653" r:id="rId6"/>
-    <p:sldLayoutId id="2147483654" r:id="rId7"/>
-    <p:sldLayoutId id="2147483655" r:id="rId8"/>
-    <p:sldLayoutId id="2147483656" r:id="rId9"/>
-    <p:sldLayoutId id="2147483657" r:id="rId10"/>
-    <p:sldLayoutId id="2147483658" r:id="rId11"/>
-    <p:sldLayoutId id="2147483659" r:id="rId12"/>
-    <p:sldLayoutId id="2147483660" r:id="rId13"/>
+    <p:sldLayoutId id="2147483649" r:id="rId1"/>
+    <p:sldLayoutId id="2147483650" r:id="rId2"/>
+    <p:sldLayoutId id="2147483651" r:id="rId3"/>
+    <p:sldLayoutId id="2147483652" r:id="rId4"/>
+    <p:sldLayoutId id="2147483653" r:id="rId5"/>
+    <p:sldLayoutId id="2147483654" r:id="rId6"/>
+    <p:sldLayoutId id="2147483655" r:id="rId7"/>
+    <p:sldLayoutId id="2147483656" r:id="rId8"/>
+    <p:sldLayoutId id="2147483657" r:id="rId9"/>
+    <p:sldLayoutId id="2147483658" r:id="rId10"/>
+    <p:sldLayoutId id="2147483659" r:id="rId11"/>
+    <p:sldLayoutId id="2147483660" r:id="rId12"/>
   </p:sldLayoutIdLst>
+  <p:txStyles>
+    <p:titleStyle/>
+    <p:bodyStyle/>
+    <p:otherStyle/>
+  </p:txStyles>
 </p:sldMaster>
 </file>
 
 <file path=ppt/slides/slide1.xml><?xml version="1.0" encoding="utf-8"?>
-<p:sld xmlns:a="http://schemas.openxmlformats.org/drawingml/2006/main" xmlns:p="http://schemas.openxmlformats.org/presentationml/2006/main" xmlns:r="http://schemas.openxmlformats.org/officeDocument/2006/relationships">
+<p:sld xmlns:a="http://schemas.openxmlformats.org/drawingml/2006/main" xmlns:r="http://schemas.openxmlformats.org/officeDocument/2006/relationships" xmlns:p="http://schemas.openxmlformats.org/presentationml/2006/main">
   <p:cSld>
     <p:spTree>
       <p:nvGrpSpPr>
@@ -1401,7 +1573,7 @@
             <a:avLst/>
           </a:prstGeom>
           <a:solidFill>
-            <a:srgbClr val="ffffff"/>
+            <a:srgbClr val="FFFFFF"/>
           </a:solidFill>
           <a:ln w="9360">
             <a:solidFill>
@@ -1431,7 +1603,7 @@
               <a:srgbClr val="000000"/>
             </a:solidFill>
             <a:round/>
-            <a:tailEnd len="med" type="arrow" w="med"/>
+            <a:tailEnd type="arrow" w="med" len="med"/>
           </a:ln>
         </p:spPr>
       </p:sp>
@@ -1455,7 +1627,7 @@
               <a:srgbClr val="000000"/>
             </a:solidFill>
             <a:round/>
-            <a:tailEnd len="med" type="arrow" w="med"/>
+            <a:tailEnd type="arrow" w="med" len="med"/>
           </a:ln>
         </p:spPr>
       </p:sp>
@@ -1479,7 +1651,7 @@
               <a:srgbClr val="000000"/>
             </a:solidFill>
             <a:round/>
-            <a:tailEnd len="med" type="arrow" w="med"/>
+            <a:tailEnd type="arrow" w="med" len="med"/>
           </a:ln>
         </p:spPr>
       </p:sp>
@@ -1503,7 +1675,8 @@
           </a:ln>
         </p:spPr>
         <p:txBody>
-          <a:bodyPr wrap="none" lIns="90000" rIns="90000" tIns="45000" bIns="45000"/>
+          <a:bodyPr wrap="none" lIns="90000" tIns="45000" rIns="90000" bIns="45000"/>
+          <a:lstStyle/>
           <a:p>
             <a:pPr>
               <a:lnSpc>
@@ -1511,15 +1684,15 @@
               </a:lnSpc>
             </a:pPr>
             <a:r>
-              <a:rPr lang="en-US" sz="1600">
+              <a:rPr lang="en-US" sz="1600" dirty="0" smtClean="0">
                 <a:solidFill>
                   <a:srgbClr val="000000"/>
                 </a:solidFill>
                 <a:latin typeface="Calibri"/>
               </a:rPr>
-              <a:t>Attack Event</a:t>
+              <a:t>Event</a:t>
             </a:r>
-            <a:endParaRPr/>
+            <a:endParaRPr dirty="0"/>
           </a:p>
           <a:p>
             <a:pPr>
@@ -1528,7 +1701,7 @@
               </a:lnSpc>
             </a:pPr>
             <a:r>
-              <a:rPr lang="en-US" sz="1600">
+              <a:rPr lang="en-US" sz="1600" dirty="0">
                 <a:solidFill>
                   <a:srgbClr val="000000"/>
                 </a:solidFill>
@@ -1536,7 +1709,7 @@
               </a:rPr>
               <a:t>Hypothesis</a:t>
             </a:r>
-            <a:endParaRPr/>
+            <a:endParaRPr dirty="0"/>
           </a:p>
         </p:txBody>
       </p:sp>
@@ -1560,7 +1733,8 @@
           </a:ln>
         </p:spPr>
         <p:txBody>
-          <a:bodyPr wrap="none" lIns="90000" rIns="90000" tIns="45000" bIns="45000"/>
+          <a:bodyPr wrap="none" lIns="90000" tIns="45000" rIns="90000" bIns="45000"/>
+          <a:lstStyle/>
           <a:p>
             <a:pPr algn="r">
               <a:lnSpc>
@@ -1595,7 +1769,7 @@
             <a:avLst/>
           </a:prstGeom>
           <a:solidFill>
-            <a:srgbClr val="ffffff"/>
+            <a:srgbClr val="FFFFFF"/>
           </a:solidFill>
           <a:ln w="9360">
             <a:solidFill>
@@ -1620,7 +1794,7 @@
             <a:avLst/>
           </a:prstGeom>
           <a:solidFill>
-            <a:srgbClr val="ffffff"/>
+            <a:srgbClr val="FFFFFF"/>
           </a:solidFill>
           <a:ln w="9360">
             <a:solidFill>
@@ -1645,7 +1819,7 @@
             <a:avLst/>
           </a:prstGeom>
           <a:solidFill>
-            <a:srgbClr val="ffffff"/>
+            <a:srgbClr val="FFFFFF"/>
           </a:solidFill>
           <a:ln w="9360">
             <a:solidFill>
@@ -1657,22 +1831,25 @@
       </p:sp>
     </p:spTree>
   </p:cSld>
+  <p:clrMapOvr>
+    <a:masterClrMapping/>
+  </p:clrMapOvr>
   <p:timing>
     <p:tnLst>
       <p:par>
-        <p:cTn id="1" dur="indefinite" restart="never" nodeType="tmRoot">
+        <p:cTn xmlns:p14="http://schemas.microsoft.com/office/powerpoint/2010/main" id="1" dur="indefinite" restart="never" nodeType="tmRoot">
           <p:childTnLst>
             <p:seq>
               <p:cTn id="2" nodeType="mainSeq"/>
               <p:prevCondLst>
-                <p:cond delay="0" evt="onPrev">
+                <p:cond evt="onPrev" delay="0">
                   <p:tgtEl>
                     <p:sldTgt/>
                   </p:tgtEl>
                 </p:cond>
               </p:prevCondLst>
               <p:nextCondLst>
-                <p:cond delay="0" evt="onNext">
+                <p:cond evt="onNext" delay="0">
                   <p:tgtEl>
                     <p:sldTgt/>
                   </p:tgtEl>
@@ -1688,7 +1865,7 @@
 </file>
 
 <file path=ppt/slides/slide2.xml><?xml version="1.0" encoding="utf-8"?>
-<p:sld xmlns:a="http://schemas.openxmlformats.org/drawingml/2006/main" xmlns:p="http://schemas.openxmlformats.org/presentationml/2006/main" xmlns:r="http://schemas.openxmlformats.org/officeDocument/2006/relationships">
+<p:sld xmlns:a="http://schemas.openxmlformats.org/drawingml/2006/main" xmlns:r="http://schemas.openxmlformats.org/officeDocument/2006/relationships" xmlns:p="http://schemas.openxmlformats.org/presentationml/2006/main">
   <p:cSld>
     <p:spTree>
       <p:nvGrpSpPr>
@@ -1719,7 +1896,7 @@
             <a:avLst/>
           </a:prstGeom>
           <a:solidFill>
-            <a:srgbClr val="ffffff"/>
+            <a:srgbClr val="FFFFFF"/>
           </a:solidFill>
           <a:ln w="9360">
             <a:solidFill>
@@ -1749,7 +1926,7 @@
               <a:srgbClr val="000000"/>
             </a:solidFill>
             <a:round/>
-            <a:tailEnd len="med" type="arrow" w="med"/>
+            <a:tailEnd type="arrow" w="med" len="med"/>
           </a:ln>
         </p:spPr>
       </p:sp>
@@ -1773,7 +1950,7 @@
               <a:srgbClr val="000000"/>
             </a:solidFill>
             <a:round/>
-            <a:tailEnd len="med" type="arrow" w="med"/>
+            <a:tailEnd type="arrow" w="med" len="med"/>
           </a:ln>
         </p:spPr>
       </p:sp>
@@ -1797,7 +1974,7 @@
               <a:srgbClr val="000000"/>
             </a:solidFill>
             <a:round/>
-            <a:tailEnd len="med" type="arrow" w="med"/>
+            <a:tailEnd type="arrow" w="med" len="med"/>
           </a:ln>
         </p:spPr>
       </p:sp>
@@ -1821,7 +1998,8 @@
           </a:ln>
         </p:spPr>
         <p:txBody>
-          <a:bodyPr wrap="none" lIns="90000" rIns="90000" tIns="45000" bIns="45000"/>
+          <a:bodyPr wrap="none" lIns="90000" tIns="45000" rIns="90000" bIns="45000"/>
+          <a:lstStyle/>
           <a:p>
             <a:pPr>
               <a:lnSpc>
@@ -1829,15 +2007,15 @@
               </a:lnSpc>
             </a:pPr>
             <a:r>
-              <a:rPr lang="en-US" sz="1600">
+              <a:rPr lang="en-US" sz="1600" dirty="0" smtClean="0">
                 <a:solidFill>
                   <a:srgbClr val="000000"/>
                 </a:solidFill>
                 <a:latin typeface="Calibri"/>
               </a:rPr>
-              <a:t>Attack Event</a:t>
+              <a:t>Event</a:t>
             </a:r>
-            <a:endParaRPr/>
+            <a:endParaRPr dirty="0"/>
           </a:p>
           <a:p>
             <a:pPr>
@@ -1846,7 +2024,7 @@
               </a:lnSpc>
             </a:pPr>
             <a:r>
-              <a:rPr lang="en-US" sz="1600">
+              <a:rPr lang="en-US" sz="1600" dirty="0">
                 <a:solidFill>
                   <a:srgbClr val="000000"/>
                 </a:solidFill>
@@ -1854,7 +2032,7 @@
               </a:rPr>
               <a:t>Hypotheses</a:t>
             </a:r>
-            <a:endParaRPr/>
+            <a:endParaRPr dirty="0"/>
           </a:p>
         </p:txBody>
       </p:sp>
@@ -1878,7 +2056,8 @@
           </a:ln>
         </p:spPr>
         <p:txBody>
-          <a:bodyPr wrap="none" lIns="90000" rIns="90000" tIns="45000" bIns="45000"/>
+          <a:bodyPr wrap="none" lIns="90000" tIns="45000" rIns="90000" bIns="45000"/>
+          <a:lstStyle/>
           <a:p>
             <a:pPr algn="r">
               <a:lnSpc>
@@ -1913,7 +2092,7 @@
             <a:avLst/>
           </a:prstGeom>
           <a:solidFill>
-            <a:srgbClr val="ffffff"/>
+            <a:srgbClr val="FFFFFF"/>
           </a:solidFill>
           <a:ln w="9360">
             <a:solidFill>
@@ -1938,7 +2117,7 @@
             <a:avLst/>
           </a:prstGeom>
           <a:solidFill>
-            <a:srgbClr val="ffffff"/>
+            <a:srgbClr val="FFFFFF"/>
           </a:solidFill>
           <a:ln w="9360">
             <a:solidFill>
@@ -1963,7 +2142,7 @@
             <a:avLst/>
           </a:prstGeom>
           <a:solidFill>
-            <a:srgbClr val="ffffff"/>
+            <a:srgbClr val="FFFFFF"/>
           </a:solidFill>
           <a:ln w="9360">
             <a:solidFill>
@@ -1988,7 +2167,7 @@
             <a:avLst/>
           </a:prstGeom>
           <a:solidFill>
-            <a:srgbClr val="ffffff"/>
+            <a:srgbClr val="FFFFFF"/>
           </a:solidFill>
           <a:ln w="9360">
             <a:solidFill>
@@ -2018,7 +2197,7 @@
               <a:srgbClr val="000000"/>
             </a:solidFill>
             <a:round/>
-            <a:tailEnd len="med" type="arrow" w="med"/>
+            <a:tailEnd type="arrow" w="med" len="med"/>
           </a:ln>
         </p:spPr>
       </p:sp>
@@ -2042,7 +2221,7 @@
               <a:srgbClr val="000000"/>
             </a:solidFill>
             <a:round/>
-            <a:tailEnd len="med" type="arrow" w="med"/>
+            <a:tailEnd type="arrow" w="med" len="med"/>
           </a:ln>
         </p:spPr>
       </p:sp>
@@ -2066,7 +2245,7 @@
               <a:srgbClr val="000000"/>
             </a:solidFill>
             <a:round/>
-            <a:tailEnd len="med" type="arrow" w="med"/>
+            <a:tailEnd type="arrow" w="med" len="med"/>
           </a:ln>
         </p:spPr>
       </p:sp>
@@ -2085,7 +2264,7 @@
             <a:avLst/>
           </a:prstGeom>
           <a:solidFill>
-            <a:srgbClr val="ffffff"/>
+            <a:srgbClr val="FFFFFF"/>
           </a:solidFill>
           <a:ln w="9360">
             <a:solidFill>
@@ -2097,22 +2276,606 @@
       </p:sp>
     </p:spTree>
   </p:cSld>
+  <p:clrMapOvr>
+    <a:masterClrMapping/>
+  </p:clrMapOvr>
   <p:timing>
     <p:tnLst>
       <p:par>
-        <p:cTn id="3" dur="indefinite" restart="never" nodeType="tmRoot">
+        <p:cTn xmlns:p14="http://schemas.microsoft.com/office/powerpoint/2010/main" id="1" dur="indefinite" restart="never" nodeType="tmRoot">
           <p:childTnLst>
             <p:seq>
-              <p:cTn id="4" nodeType="mainSeq"/>
+              <p:cTn id="2" nodeType="mainSeq"/>
               <p:prevCondLst>
-                <p:cond delay="0" evt="onPrev">
+                <p:cond evt="onPrev" delay="0">
                   <p:tgtEl>
                     <p:sldTgt/>
                   </p:tgtEl>
                 </p:cond>
               </p:prevCondLst>
               <p:nextCondLst>
-                <p:cond delay="0" evt="onNext">
+                <p:cond evt="onNext" delay="0">
+                  <p:tgtEl>
+                    <p:sldTgt/>
+                  </p:tgtEl>
+                </p:cond>
+              </p:nextCondLst>
+            </p:seq>
+          </p:childTnLst>
+        </p:cTn>
+      </p:par>
+    </p:tnLst>
+  </p:timing>
+</p:sld>
+</file>
+
+<file path=ppt/slides/slide3.xml><?xml version="1.0" encoding="utf-8"?>
+<p:sld xmlns:a="http://schemas.openxmlformats.org/drawingml/2006/main" xmlns:r="http://schemas.openxmlformats.org/officeDocument/2006/relationships" xmlns:p="http://schemas.openxmlformats.org/presentationml/2006/main">
+  <p:cSld>
+    <p:spTree>
+      <p:nvGrpSpPr>
+        <p:cNvPr id="1" name=""/>
+        <p:cNvGrpSpPr/>
+        <p:nvPr/>
+      </p:nvGrpSpPr>
+      <p:grpSpPr>
+        <a:xfrm>
+          <a:off x="0" y="0"/>
+          <a:ext cx="0" cy="0"/>
+          <a:chOff x="0" y="0"/>
+          <a:chExt cx="0" cy="0"/>
+        </a:xfrm>
+      </p:grpSpPr>
+      <p:sp>
+        <p:nvSpPr>
+          <p:cNvPr id="45" name="CustomShape 1"/>
+          <p:cNvSpPr/>
+          <p:nvPr/>
+        </p:nvSpPr>
+        <p:spPr>
+          <a:xfrm>
+            <a:off x="2139480" y="1920240"/>
+            <a:ext cx="279720" cy="306000"/>
+          </a:xfrm>
+          <a:prstGeom prst="ellipse">
+            <a:avLst/>
+          </a:prstGeom>
+          <a:solidFill>
+            <a:srgbClr val="FFFFFF"/>
+          </a:solidFill>
+          <a:ln w="9360">
+            <a:solidFill>
+              <a:srgbClr val="000000"/>
+            </a:solidFill>
+            <a:round/>
+          </a:ln>
+        </p:spPr>
+      </p:sp>
+      <p:sp>
+        <p:nvSpPr>
+          <p:cNvPr id="46" name="CustomShape 2"/>
+          <p:cNvSpPr/>
+          <p:nvPr/>
+        </p:nvSpPr>
+        <p:spPr>
+          <a:xfrm flipH="1">
+            <a:off x="1830240" y="2226960"/>
+            <a:ext cx="455760" cy="607680"/>
+          </a:xfrm>
+          <a:prstGeom prst="straightConnector1">
+            <a:avLst/>
+          </a:prstGeom>
+          <a:noFill/>
+          <a:ln w="25560">
+            <a:solidFill>
+              <a:srgbClr val="000000"/>
+            </a:solidFill>
+            <a:round/>
+            <a:tailEnd type="arrow" w="med" len="med"/>
+          </a:ln>
+        </p:spPr>
+      </p:sp>
+      <p:sp>
+        <p:nvSpPr>
+          <p:cNvPr id="47" name="CustomShape 3"/>
+          <p:cNvSpPr/>
+          <p:nvPr/>
+        </p:nvSpPr>
+        <p:spPr>
+          <a:xfrm>
+            <a:off x="2286000" y="2226960"/>
+            <a:ext cx="118800" cy="607680"/>
+          </a:xfrm>
+          <a:prstGeom prst="straightConnector1">
+            <a:avLst/>
+          </a:prstGeom>
+          <a:noFill/>
+          <a:ln w="25560">
+            <a:solidFill>
+              <a:srgbClr val="000000"/>
+            </a:solidFill>
+            <a:round/>
+            <a:tailEnd type="arrow" w="med" len="med"/>
+          </a:ln>
+        </p:spPr>
+      </p:sp>
+      <p:sp>
+        <p:nvSpPr>
+          <p:cNvPr id="48" name="CustomShape 4"/>
+          <p:cNvSpPr/>
+          <p:nvPr/>
+        </p:nvSpPr>
+        <p:spPr>
+          <a:xfrm>
+            <a:off x="2286000" y="2226960"/>
+            <a:ext cx="731520" cy="607680"/>
+          </a:xfrm>
+          <a:prstGeom prst="straightConnector1">
+            <a:avLst/>
+          </a:prstGeom>
+          <a:noFill/>
+          <a:ln w="25560">
+            <a:solidFill>
+              <a:srgbClr val="000000"/>
+            </a:solidFill>
+            <a:round/>
+            <a:tailEnd type="arrow" w="med" len="med"/>
+          </a:ln>
+        </p:spPr>
+      </p:sp>
+      <p:sp>
+        <p:nvSpPr>
+          <p:cNvPr id="49" name="CustomShape 5"/>
+          <p:cNvSpPr/>
+          <p:nvPr/>
+        </p:nvSpPr>
+        <p:spPr>
+          <a:xfrm>
+            <a:off x="3474720" y="1741536"/>
+            <a:ext cx="1637640" cy="638640"/>
+          </a:xfrm>
+          <a:prstGeom prst="rect">
+            <a:avLst/>
+          </a:prstGeom>
+          <a:noFill/>
+          <a:ln>
+            <a:noFill/>
+          </a:ln>
+        </p:spPr>
+        <p:txBody>
+          <a:bodyPr wrap="none" lIns="90000" tIns="45000" rIns="90000" bIns="45000"/>
+          <a:lstStyle/>
+          <a:p>
+            <a:pPr>
+              <a:lnSpc>
+                <a:spcPct val="100000"/>
+              </a:lnSpc>
+            </a:pPr>
+            <a:r>
+              <a:rPr lang="en-US" sz="1600" dirty="0" smtClean="0">
+                <a:solidFill>
+                  <a:srgbClr val="000000"/>
+                </a:solidFill>
+                <a:latin typeface="Calibri"/>
+              </a:rPr>
+              <a:t>Component Event</a:t>
+            </a:r>
+            <a:endParaRPr dirty="0"/>
+          </a:p>
+          <a:p>
+            <a:pPr>
+              <a:lnSpc>
+                <a:spcPct val="100000"/>
+              </a:lnSpc>
+            </a:pPr>
+            <a:r>
+              <a:rPr lang="en-US" sz="1600" dirty="0">
+                <a:solidFill>
+                  <a:srgbClr val="000000"/>
+                </a:solidFill>
+                <a:latin typeface="Calibri"/>
+              </a:rPr>
+              <a:t>Hypotheses</a:t>
+            </a:r>
+            <a:endParaRPr dirty="0"/>
+          </a:p>
+        </p:txBody>
+      </p:sp>
+      <p:sp>
+        <p:nvSpPr>
+          <p:cNvPr id="50" name="CustomShape 6"/>
+          <p:cNvSpPr/>
+          <p:nvPr/>
+        </p:nvSpPr>
+        <p:spPr>
+          <a:xfrm>
+            <a:off x="1683000" y="3200400"/>
+            <a:ext cx="1334520" cy="365760"/>
+          </a:xfrm>
+          <a:prstGeom prst="rect">
+            <a:avLst/>
+          </a:prstGeom>
+          <a:noFill/>
+          <a:ln>
+            <a:noFill/>
+          </a:ln>
+        </p:spPr>
+        <p:txBody>
+          <a:bodyPr wrap="none" lIns="90000" tIns="45000" rIns="90000" bIns="45000"/>
+          <a:lstStyle/>
+          <a:p>
+            <a:pPr algn="r">
+              <a:lnSpc>
+                <a:spcPct val="100000"/>
+              </a:lnSpc>
+            </a:pPr>
+            <a:r>
+              <a:rPr lang="en-US" sz="1600">
+                <a:solidFill>
+                  <a:srgbClr val="000000"/>
+                </a:solidFill>
+                <a:latin typeface="Calibri"/>
+              </a:rPr>
+              <a:t>IDS Reports</a:t>
+            </a:r>
+            <a:endParaRPr/>
+          </a:p>
+        </p:txBody>
+      </p:sp>
+      <p:sp>
+        <p:nvSpPr>
+          <p:cNvPr id="51" name="CustomShape 7"/>
+          <p:cNvSpPr/>
+          <p:nvPr/>
+        </p:nvSpPr>
+        <p:spPr>
+          <a:xfrm>
+            <a:off x="1731960" y="2834640"/>
+            <a:ext cx="279720" cy="306000"/>
+          </a:xfrm>
+          <a:prstGeom prst="ellipse">
+            <a:avLst/>
+          </a:prstGeom>
+          <a:solidFill>
+            <a:srgbClr val="FFFFFF"/>
+          </a:solidFill>
+          <a:ln w="9360">
+            <a:solidFill>
+              <a:srgbClr val="000000"/>
+            </a:solidFill>
+            <a:round/>
+          </a:ln>
+        </p:spPr>
+      </p:sp>
+      <p:sp>
+        <p:nvSpPr>
+          <p:cNvPr id="52" name="CustomShape 8"/>
+          <p:cNvSpPr/>
+          <p:nvPr/>
+        </p:nvSpPr>
+        <p:spPr>
+          <a:xfrm>
+            <a:off x="2280600" y="2834640"/>
+            <a:ext cx="279720" cy="306000"/>
+          </a:xfrm>
+          <a:prstGeom prst="ellipse">
+            <a:avLst/>
+          </a:prstGeom>
+          <a:solidFill>
+            <a:srgbClr val="FFFFFF"/>
+          </a:solidFill>
+          <a:ln w="9360">
+            <a:solidFill>
+              <a:srgbClr val="000000"/>
+            </a:solidFill>
+            <a:round/>
+          </a:ln>
+        </p:spPr>
+      </p:sp>
+      <p:sp>
+        <p:nvSpPr>
+          <p:cNvPr id="53" name="CustomShape 9"/>
+          <p:cNvSpPr/>
+          <p:nvPr/>
+        </p:nvSpPr>
+        <p:spPr>
+          <a:xfrm>
+            <a:off x="2920680" y="2834640"/>
+            <a:ext cx="279720" cy="306000"/>
+          </a:xfrm>
+          <a:prstGeom prst="ellipse">
+            <a:avLst/>
+          </a:prstGeom>
+          <a:solidFill>
+            <a:srgbClr val="FFFFFF"/>
+          </a:solidFill>
+          <a:ln w="9360">
+            <a:solidFill>
+              <a:srgbClr val="000000"/>
+            </a:solidFill>
+            <a:round/>
+          </a:ln>
+        </p:spPr>
+      </p:sp>
+      <p:sp>
+        <p:nvSpPr>
+          <p:cNvPr id="54" name="CustomShape 10"/>
+          <p:cNvSpPr/>
+          <p:nvPr/>
+        </p:nvSpPr>
+        <p:spPr>
+          <a:xfrm>
+            <a:off x="2993760" y="1929960"/>
+            <a:ext cx="279720" cy="306000"/>
+          </a:xfrm>
+          <a:prstGeom prst="ellipse">
+            <a:avLst/>
+          </a:prstGeom>
+          <a:solidFill>
+            <a:srgbClr val="FFFFFF"/>
+          </a:solidFill>
+          <a:ln w="9360">
+            <a:solidFill>
+              <a:srgbClr val="000000"/>
+            </a:solidFill>
+            <a:round/>
+          </a:ln>
+        </p:spPr>
+      </p:sp>
+      <p:sp>
+        <p:nvSpPr>
+          <p:cNvPr id="55" name="CustomShape 11"/>
+          <p:cNvSpPr/>
+          <p:nvPr/>
+        </p:nvSpPr>
+        <p:spPr>
+          <a:xfrm flipH="1">
+            <a:off x="2419200" y="2235960"/>
+            <a:ext cx="689760" cy="607680"/>
+          </a:xfrm>
+          <a:prstGeom prst="straightConnector1">
+            <a:avLst/>
+          </a:prstGeom>
+          <a:noFill/>
+          <a:ln w="25560">
+            <a:solidFill>
+              <a:srgbClr val="000000"/>
+            </a:solidFill>
+            <a:round/>
+            <a:tailEnd type="arrow" w="med" len="med"/>
+          </a:ln>
+        </p:spPr>
+      </p:sp>
+      <p:sp>
+        <p:nvSpPr>
+          <p:cNvPr id="56" name="CustomShape 12"/>
+          <p:cNvSpPr/>
+          <p:nvPr/>
+        </p:nvSpPr>
+        <p:spPr>
+          <a:xfrm flipH="1">
+            <a:off x="2993760" y="2235960"/>
+            <a:ext cx="115200" cy="607680"/>
+          </a:xfrm>
+          <a:prstGeom prst="straightConnector1">
+            <a:avLst/>
+          </a:prstGeom>
+          <a:noFill/>
+          <a:ln w="25560">
+            <a:solidFill>
+              <a:srgbClr val="000000"/>
+            </a:solidFill>
+            <a:round/>
+            <a:tailEnd type="arrow" w="med" len="med"/>
+          </a:ln>
+        </p:spPr>
+      </p:sp>
+      <p:sp>
+        <p:nvSpPr>
+          <p:cNvPr id="57" name="CustomShape 13"/>
+          <p:cNvSpPr/>
+          <p:nvPr/>
+        </p:nvSpPr>
+        <p:spPr>
+          <a:xfrm>
+            <a:off x="3108960" y="2235960"/>
+            <a:ext cx="497520" cy="607680"/>
+          </a:xfrm>
+          <a:prstGeom prst="straightConnector1">
+            <a:avLst/>
+          </a:prstGeom>
+          <a:noFill/>
+          <a:ln w="25560">
+            <a:solidFill>
+              <a:srgbClr val="000000"/>
+            </a:solidFill>
+            <a:round/>
+            <a:tailEnd type="arrow" w="med" len="med"/>
+          </a:ln>
+        </p:spPr>
+      </p:sp>
+      <p:sp>
+        <p:nvSpPr>
+          <p:cNvPr id="58" name="CustomShape 14"/>
+          <p:cNvSpPr/>
+          <p:nvPr/>
+        </p:nvSpPr>
+        <p:spPr>
+          <a:xfrm>
+            <a:off x="3474720" y="2843640"/>
+            <a:ext cx="279720" cy="306000"/>
+          </a:xfrm>
+          <a:prstGeom prst="ellipse">
+            <a:avLst/>
+          </a:prstGeom>
+          <a:solidFill>
+            <a:srgbClr val="FFFFFF"/>
+          </a:solidFill>
+          <a:ln w="9360">
+            <a:solidFill>
+              <a:srgbClr val="000000"/>
+            </a:solidFill>
+            <a:round/>
+          </a:ln>
+        </p:spPr>
+      </p:sp>
+      <p:sp>
+        <p:nvSpPr>
+          <p:cNvPr id="17" name="CustomShape 5"/>
+          <p:cNvSpPr/>
+          <p:nvPr/>
+        </p:nvSpPr>
+        <p:spPr>
+          <a:xfrm>
+            <a:off x="2993760" y="1042018"/>
+            <a:ext cx="1637640" cy="638640"/>
+          </a:xfrm>
+          <a:prstGeom prst="rect">
+            <a:avLst/>
+          </a:prstGeom>
+          <a:noFill/>
+          <a:ln>
+            <a:noFill/>
+          </a:ln>
+        </p:spPr>
+        <p:txBody>
+          <a:bodyPr wrap="none" lIns="90000" tIns="45000" rIns="90000" bIns="45000"/>
+          <a:lstStyle/>
+          <a:p>
+            <a:pPr>
+              <a:lnSpc>
+                <a:spcPct val="100000"/>
+              </a:lnSpc>
+            </a:pPr>
+            <a:r>
+              <a:rPr lang="en-US" sz="1600" dirty="0" smtClean="0">
+                <a:solidFill>
+                  <a:srgbClr val="000000"/>
+                </a:solidFill>
+                <a:latin typeface="Calibri"/>
+              </a:rPr>
+              <a:t>Composite Event</a:t>
+            </a:r>
+            <a:endParaRPr dirty="0"/>
+          </a:p>
+          <a:p>
+            <a:pPr>
+              <a:lnSpc>
+                <a:spcPct val="100000"/>
+              </a:lnSpc>
+            </a:pPr>
+            <a:r>
+              <a:rPr lang="en-US" sz="1600" dirty="0" smtClean="0">
+                <a:solidFill>
+                  <a:srgbClr val="000000"/>
+                </a:solidFill>
+                <a:latin typeface="Calibri"/>
+              </a:rPr>
+              <a:t>Hypothesis</a:t>
+            </a:r>
+            <a:endParaRPr dirty="0"/>
+          </a:p>
+        </p:txBody>
+      </p:sp>
+      <p:sp>
+        <p:nvSpPr>
+          <p:cNvPr id="19" name="CustomShape 2"/>
+          <p:cNvSpPr/>
+          <p:nvPr/>
+        </p:nvSpPr>
+        <p:spPr>
+          <a:xfrm flipH="1">
+            <a:off x="2286000" y="1552313"/>
+            <a:ext cx="372312" cy="367927"/>
+          </a:xfrm>
+          <a:prstGeom prst="straightConnector1">
+            <a:avLst/>
+          </a:prstGeom>
+          <a:noFill/>
+          <a:ln w="25560">
+            <a:solidFill>
+              <a:srgbClr val="000000"/>
+            </a:solidFill>
+            <a:round/>
+            <a:tailEnd type="arrow" w="med" len="med"/>
+          </a:ln>
+        </p:spPr>
+      </p:sp>
+      <p:sp>
+        <p:nvSpPr>
+          <p:cNvPr id="20" name="CustomShape 2"/>
+          <p:cNvSpPr/>
+          <p:nvPr/>
+        </p:nvSpPr>
+        <p:spPr>
+          <a:xfrm>
+            <a:off x="2658312" y="1420567"/>
+            <a:ext cx="450647" cy="509394"/>
+          </a:xfrm>
+          <a:prstGeom prst="straightConnector1">
+            <a:avLst/>
+          </a:prstGeom>
+          <a:noFill/>
+          <a:ln w="25560">
+            <a:solidFill>
+              <a:srgbClr val="000000"/>
+            </a:solidFill>
+            <a:round/>
+            <a:tailEnd type="arrow" w="med" len="med"/>
+          </a:ln>
+        </p:spPr>
+      </p:sp>
+      <p:sp>
+        <p:nvSpPr>
+          <p:cNvPr id="16" name="CustomShape 1"/>
+          <p:cNvSpPr/>
+          <p:nvPr/>
+        </p:nvSpPr>
+        <p:spPr>
+          <a:xfrm>
+            <a:off x="2560320" y="1289361"/>
+            <a:ext cx="279720" cy="306000"/>
+          </a:xfrm>
+          <a:prstGeom prst="ellipse">
+            <a:avLst/>
+          </a:prstGeom>
+          <a:solidFill>
+            <a:srgbClr val="FFFFFF"/>
+          </a:solidFill>
+          <a:ln w="9360">
+            <a:solidFill>
+              <a:srgbClr val="000000"/>
+            </a:solidFill>
+            <a:round/>
+          </a:ln>
+        </p:spPr>
+      </p:sp>
+    </p:spTree>
+    <p:extLst>
+      <p:ext uri="{BB962C8B-B14F-4D97-AF65-F5344CB8AC3E}">
+        <p14:creationId xmlns:p14="http://schemas.microsoft.com/office/powerpoint/2010/main" val="3296426821"/>
+      </p:ext>
+    </p:extLst>
+  </p:cSld>
+  <p:clrMapOvr>
+    <a:masterClrMapping/>
+  </p:clrMapOvr>
+  <p:timing>
+    <p:tnLst>
+      <p:par>
+        <p:cTn xmlns:p14="http://schemas.microsoft.com/office/powerpoint/2010/main" id="1" dur="indefinite" restart="never" nodeType="tmRoot">
+          <p:childTnLst>
+            <p:seq>
+              <p:cTn id="2" nodeType="mainSeq"/>
+              <p:prevCondLst>
+                <p:cond evt="onPrev" delay="0">
+                  <p:tgtEl>
+                    <p:sldTgt/>
+                  </p:tgtEl>
+                </p:cond>
+              </p:prevCondLst>
+              <p:nextCondLst>
+                <p:cond evt="onNext" delay="0">
                   <p:tgtEl>
                     <p:sldTgt/>
                   </p:tgtEl>
@@ -2347,5 +3110,7 @@
       </a:bgFillStyleLst>
     </a:fmtScheme>
   </a:themeElements>
+  <a:objectDefaults/>
+  <a:extraClrSchemeLst/>
 </a:theme>
 </file>
</xml_diff>